<commit_message>
added mockups and details
</commit_message>
<xml_diff>
--- a/4-ShikkhokBatayon.pptx
+++ b/4-ShikkhokBatayon.pptx
@@ -13,6 +13,10 @@
     <p:sldId id="261" r:id="rId8"/>
     <p:sldId id="262" r:id="rId9"/>
     <p:sldId id="263" r:id="rId10"/>
+    <p:sldId id="264" r:id="rId11"/>
+    <p:sldId id="265" r:id="rId12"/>
+    <p:sldId id="266" r:id="rId13"/>
+    <p:sldId id="267" r:id="rId14"/>
   </p:sldIdLst>
   <p:sldSz cx="9144000" cy="5143500"/>
   <p:notesSz cx="7559675" cy="10691812"/>
@@ -70,8 +74,8 @@
         </p:nvSpPr>
         <p:spPr>
           <a:xfrm>
-            <a:off x="685800" y="1597680"/>
-            <a:ext cx="7771320" cy="1102680"/>
+            <a:off x="457200" y="205200"/>
+            <a:ext cx="8229240" cy="858960"/>
           </a:xfrm>
           <a:prstGeom prst="rect">
             <a:avLst/>
@@ -98,7 +102,7 @@
         <p:spPr>
           <a:xfrm>
             <a:off x="457200" y="1203480"/>
-            <a:ext cx="8228880" cy="1422360"/>
+            <a:ext cx="8229240" cy="1422360"/>
           </a:xfrm>
           <a:prstGeom prst="rect">
             <a:avLst/>
@@ -124,7 +128,7 @@
         <p:spPr>
           <a:xfrm>
             <a:off x="457200" y="2761200"/>
-            <a:ext cx="8228880" cy="1422360"/>
+            <a:ext cx="8229240" cy="1422360"/>
           </a:xfrm>
           <a:prstGeom prst="rect">
             <a:avLst/>
@@ -171,8 +175,8 @@
         </p:nvSpPr>
         <p:spPr>
           <a:xfrm>
-            <a:off x="685800" y="1597680"/>
-            <a:ext cx="7771320" cy="1102680"/>
+            <a:off x="457200" y="205200"/>
+            <a:ext cx="8229240" cy="858960"/>
           </a:xfrm>
           <a:prstGeom prst="rect">
             <a:avLst/>
@@ -324,8 +328,8 @@
         </p:nvSpPr>
         <p:spPr>
           <a:xfrm>
-            <a:off x="685800" y="1597680"/>
-            <a:ext cx="7771320" cy="1102680"/>
+            <a:off x="457200" y="205200"/>
+            <a:ext cx="8229240" cy="858960"/>
           </a:xfrm>
           <a:prstGeom prst="rect">
             <a:avLst/>
@@ -425,8 +429,8 @@
         </p:nvSpPr>
         <p:spPr>
           <a:xfrm>
-            <a:off x="685800" y="1597680"/>
-            <a:ext cx="7771320" cy="1102680"/>
+            <a:off x="457200" y="205200"/>
+            <a:ext cx="8229240" cy="858960"/>
           </a:xfrm>
           <a:prstGeom prst="rect">
             <a:avLst/>
@@ -453,7 +457,7 @@
         <p:spPr>
           <a:xfrm>
             <a:off x="457200" y="1203480"/>
-            <a:ext cx="8228880" cy="2982960"/>
+            <a:ext cx="8229240" cy="2983320"/>
           </a:xfrm>
           <a:prstGeom prst="rect">
             <a:avLst/>
@@ -501,8 +505,8 @@
         </p:nvSpPr>
         <p:spPr>
           <a:xfrm>
-            <a:off x="685800" y="1597680"/>
-            <a:ext cx="7771320" cy="1102680"/>
+            <a:off x="457200" y="205200"/>
+            <a:ext cx="8229240" cy="858960"/>
           </a:xfrm>
           <a:prstGeom prst="rect">
             <a:avLst/>
@@ -529,7 +533,7 @@
         <p:spPr>
           <a:xfrm>
             <a:off x="457200" y="1203480"/>
-            <a:ext cx="8228880" cy="2982600"/>
+            <a:ext cx="8229240" cy="2982960"/>
           </a:xfrm>
           <a:prstGeom prst="rect">
             <a:avLst/>
@@ -576,8 +580,8 @@
         </p:nvSpPr>
         <p:spPr>
           <a:xfrm>
-            <a:off x="685800" y="1597680"/>
-            <a:ext cx="7771320" cy="1102680"/>
+            <a:off x="457200" y="205200"/>
+            <a:ext cx="8229240" cy="858960"/>
           </a:xfrm>
           <a:prstGeom prst="rect">
             <a:avLst/>
@@ -604,7 +608,7 @@
         <p:spPr>
           <a:xfrm>
             <a:off x="457200" y="1203480"/>
-            <a:ext cx="4015440" cy="2982600"/>
+            <a:ext cx="4015440" cy="2982960"/>
           </a:xfrm>
           <a:prstGeom prst="rect">
             <a:avLst/>
@@ -630,7 +634,7 @@
         <p:spPr>
           <a:xfrm>
             <a:off x="4673520" y="1203480"/>
-            <a:ext cx="4015440" cy="2982600"/>
+            <a:ext cx="4015440" cy="2982960"/>
           </a:xfrm>
           <a:prstGeom prst="rect">
             <a:avLst/>
@@ -677,8 +681,8 @@
         </p:nvSpPr>
         <p:spPr>
           <a:xfrm>
-            <a:off x="685800" y="1597680"/>
-            <a:ext cx="7771320" cy="1102680"/>
+            <a:off x="457200" y="205200"/>
+            <a:ext cx="8229240" cy="858960"/>
           </a:xfrm>
           <a:prstGeom prst="rect">
             <a:avLst/>
@@ -726,8 +730,8 @@
         </p:nvSpPr>
         <p:spPr>
           <a:xfrm>
-            <a:off x="685800" y="1597680"/>
-            <a:ext cx="7771320" cy="2588400"/>
+            <a:off x="457200" y="205200"/>
+            <a:ext cx="8229240" cy="3981240"/>
           </a:xfrm>
           <a:prstGeom prst="rect">
             <a:avLst/>
@@ -775,8 +779,8 @@
         </p:nvSpPr>
         <p:spPr>
           <a:xfrm>
-            <a:off x="685800" y="1597680"/>
-            <a:ext cx="7771320" cy="1102680"/>
+            <a:off x="457200" y="205200"/>
+            <a:ext cx="8229240" cy="858960"/>
           </a:xfrm>
           <a:prstGeom prst="rect">
             <a:avLst/>
@@ -855,7 +859,7 @@
         <p:spPr>
           <a:xfrm>
             <a:off x="4673520" y="1203480"/>
-            <a:ext cx="4015440" cy="2982600"/>
+            <a:ext cx="4015440" cy="2982960"/>
           </a:xfrm>
           <a:prstGeom prst="rect">
             <a:avLst/>
@@ -902,8 +906,8 @@
         </p:nvSpPr>
         <p:spPr>
           <a:xfrm>
-            <a:off x="685800" y="1597680"/>
-            <a:ext cx="7771320" cy="1102680"/>
+            <a:off x="457200" y="205200"/>
+            <a:ext cx="8229240" cy="858960"/>
           </a:xfrm>
           <a:prstGeom prst="rect">
             <a:avLst/>
@@ -930,7 +934,7 @@
         <p:spPr>
           <a:xfrm>
             <a:off x="457200" y="1203480"/>
-            <a:ext cx="4015440" cy="2982600"/>
+            <a:ext cx="4015440" cy="2982960"/>
           </a:xfrm>
           <a:prstGeom prst="rect">
             <a:avLst/>
@@ -1029,8 +1033,8 @@
         </p:nvSpPr>
         <p:spPr>
           <a:xfrm>
-            <a:off x="685800" y="1597680"/>
-            <a:ext cx="7771320" cy="1102680"/>
+            <a:off x="457200" y="205200"/>
+            <a:ext cx="8229240" cy="858960"/>
           </a:xfrm>
           <a:prstGeom prst="rect">
             <a:avLst/>
@@ -1130,16 +1134,6 @@
 <file path=ppt/slideMasters/slideMaster1.xml><?xml version="1.0" encoding="utf-8"?>
 <p:sldMaster xmlns:a="http://schemas.openxmlformats.org/drawingml/2006/main" xmlns:p="http://schemas.openxmlformats.org/presentationml/2006/main" xmlns:r="http://schemas.openxmlformats.org/officeDocument/2006/relationships">
   <p:cSld>
-    <p:bg>
-      <p:bgPr>
-        <a:blipFill>
-          <a:blip r:embed="rId2"/>
-          <a:stretch>
-            <a:fillRect/>
-          </a:stretch>
-        </a:blipFill>
-      </p:bgPr>
-    </p:bg>
     <p:spTree>
       <p:nvGrpSpPr>
         <p:cNvPr id="1" name=""/>
@@ -1166,8 +1160,8 @@
         </p:nvSpPr>
         <p:spPr>
           <a:xfrm>
-            <a:off x="685800" y="1597680"/>
-            <a:ext cx="7771320" cy="1102320"/>
+            <a:off x="457200" y="205200"/>
+            <a:ext cx="8229240" cy="858600"/>
           </a:xfrm>
           <a:prstGeom prst="rect">
             <a:avLst/>
@@ -1176,6 +1170,7 @@
         <p:txBody>
           <a:bodyPr anchor="ctr" bIns="0" lIns="0" rIns="0" tIns="0" wrap="none"/>
           <a:p>
+            <a:pPr algn="ctr"/>
             <a:r>
               <a:rPr lang="en-US"/>
               <a:t>Click to edit the title text format</a:t>
@@ -1197,7 +1192,7 @@
         <p:spPr>
           <a:xfrm>
             <a:off x="457200" y="1203480"/>
-            <a:ext cx="8228880" cy="2982600"/>
+            <a:ext cx="8229240" cy="2982960"/>
           </a:xfrm>
           <a:prstGeom prst="rect">
             <a:avLst/>
@@ -1295,18 +1290,18 @@
   </p:cSld>
   <p:clrMap accent1="accent1" accent2="accent2" accent3="accent3" accent4="accent4" accent5="accent5" accent6="accent6" bg1="lt1" bg2="lt2" folHlink="folHlink" hlink="hlink" tx1="dk1" tx2="dk2"/>
   <p:sldLayoutIdLst>
-    <p:sldLayoutId id="2147483649" r:id="rId3"/>
-    <p:sldLayoutId id="2147483650" r:id="rId4"/>
-    <p:sldLayoutId id="2147483651" r:id="rId5"/>
-    <p:sldLayoutId id="2147483652" r:id="rId6"/>
-    <p:sldLayoutId id="2147483653" r:id="rId7"/>
-    <p:sldLayoutId id="2147483654" r:id="rId8"/>
-    <p:sldLayoutId id="2147483655" r:id="rId9"/>
-    <p:sldLayoutId id="2147483656" r:id="rId10"/>
-    <p:sldLayoutId id="2147483657" r:id="rId11"/>
-    <p:sldLayoutId id="2147483658" r:id="rId12"/>
-    <p:sldLayoutId id="2147483659" r:id="rId13"/>
-    <p:sldLayoutId id="2147483660" r:id="rId14"/>
+    <p:sldLayoutId id="2147483649" r:id="rId2"/>
+    <p:sldLayoutId id="2147483650" r:id="rId3"/>
+    <p:sldLayoutId id="2147483651" r:id="rId4"/>
+    <p:sldLayoutId id="2147483652" r:id="rId5"/>
+    <p:sldLayoutId id="2147483653" r:id="rId6"/>
+    <p:sldLayoutId id="2147483654" r:id="rId7"/>
+    <p:sldLayoutId id="2147483655" r:id="rId8"/>
+    <p:sldLayoutId id="2147483656" r:id="rId9"/>
+    <p:sldLayoutId id="2147483657" r:id="rId10"/>
+    <p:sldLayoutId id="2147483658" r:id="rId11"/>
+    <p:sldLayoutId id="2147483659" r:id="rId12"/>
+    <p:sldLayoutId id="2147483660" r:id="rId13"/>
   </p:sldLayoutIdLst>
 </p:sldMaster>
 </file>
@@ -1314,16 +1309,6 @@
 <file path=ppt/slides/slide1.xml><?xml version="1.0" encoding="utf-8"?>
 <p:sld xmlns:a="http://schemas.openxmlformats.org/drawingml/2006/main" xmlns:p="http://schemas.openxmlformats.org/presentationml/2006/main" xmlns:r="http://schemas.openxmlformats.org/officeDocument/2006/relationships">
   <p:cSld>
-    <p:bg>
-      <p:bgPr>
-        <a:blipFill>
-          <a:blip r:embed="rId1"/>
-          <a:stretch>
-            <a:fillRect/>
-          </a:stretch>
-        </a:blipFill>
-      </p:bgPr>
-    </p:bg>
     <p:spTree>
       <p:nvGrpSpPr>
         <p:cNvPr id="1" name=""/>
@@ -1347,7 +1332,7 @@
         <p:spPr>
           <a:xfrm>
             <a:off x="685800" y="1200240"/>
-            <a:ext cx="7771320" cy="1101600"/>
+            <a:ext cx="7770600" cy="1100880"/>
           </a:xfrm>
           <a:prstGeom prst="rect">
             <a:avLst/>
@@ -1364,7 +1349,7 @@
             <a:r>
               <a:rPr b="1" lang="en-US" sz="4400">
                 <a:solidFill>
-                  <a:srgbClr val="ffc000"/>
+                  <a:srgbClr val="ff420e"/>
                 </a:solidFill>
                 <a:latin typeface="Calibri"/>
               </a:rPr>
@@ -1383,7 +1368,7 @@
         <p:spPr>
           <a:xfrm>
             <a:off x="1371600" y="2517120"/>
-            <a:ext cx="6399720" cy="1313280"/>
+            <a:ext cx="6491880" cy="1871640"/>
           </a:xfrm>
           <a:prstGeom prst="rect">
             <a:avLst/>
@@ -1414,10 +1399,18 @@
                 <a:spcPct val="100000"/>
               </a:lnSpc>
             </a:pPr>
+            <a:endParaRPr/>
+          </a:p>
+          <a:p>
+            <a:pPr algn="ctr">
+              <a:lnSpc>
+                <a:spcPct val="100000"/>
+              </a:lnSpc>
+            </a:pPr>
             <a:r>
               <a:rPr lang="en-US" sz="3200">
                 <a:solidFill>
-                  <a:srgbClr val="8b8b8b"/>
+                  <a:srgbClr val="993366"/>
                 </a:solidFill>
                 <a:latin typeface="Calibri"/>
               </a:rPr>
@@ -1439,6 +1432,632 @@
           <p:childTnLst>
             <p:seq>
               <p:cTn id="2" nodeType="mainSeq"/>
+              <p:prevCondLst>
+                <p:cond delay="0" evt="onPrev">
+                  <p:tgtEl>
+                    <p:sldTgt/>
+                  </p:tgtEl>
+                </p:cond>
+              </p:prevCondLst>
+              <p:nextCondLst>
+                <p:cond delay="0" evt="onNext">
+                  <p:tgtEl>
+                    <p:sldTgt/>
+                  </p:tgtEl>
+                </p:cond>
+              </p:nextCondLst>
+            </p:seq>
+          </p:childTnLst>
+        </p:cTn>
+      </p:par>
+    </p:tnLst>
+  </p:timing>
+</p:sld>
+</file>
+
+<file path=ppt/slides/slide10.xml><?xml version="1.0" encoding="utf-8"?>
+<p:sld xmlns:a="http://schemas.openxmlformats.org/drawingml/2006/main" xmlns:p="http://schemas.openxmlformats.org/presentationml/2006/main" xmlns:r="http://schemas.openxmlformats.org/officeDocument/2006/relationships">
+  <p:cSld>
+    <p:spTree>
+      <p:nvGrpSpPr>
+        <p:cNvPr id="1" name=""/>
+        <p:cNvGrpSpPr/>
+        <p:nvPr/>
+      </p:nvGrpSpPr>
+      <p:grpSpPr>
+        <a:xfrm>
+          <a:off x="0" y="0"/>
+          <a:ext cx="0" cy="0"/>
+          <a:chOff x="0" y="0"/>
+          <a:chExt cx="0" cy="0"/>
+        </a:xfrm>
+      </p:grpSpPr>
+      <p:sp>
+        <p:nvSpPr>
+          <p:cNvPr id="57" name="CustomShape 1"/>
+          <p:cNvSpPr/>
+          <p:nvPr/>
+        </p:nvSpPr>
+        <p:spPr>
+          <a:xfrm>
+            <a:off x="685800" y="1047600"/>
+            <a:ext cx="7770600" cy="1100880"/>
+          </a:xfrm>
+          <a:prstGeom prst="rect">
+            <a:avLst/>
+          </a:prstGeom>
+        </p:spPr>
+        <p:txBody>
+          <a:bodyPr anchor="ctr" bIns="45000" lIns="90000" rIns="90000" tIns="45000"/>
+          <a:p>
+            <a:pPr algn="ctr">
+              <a:lnSpc>
+                <a:spcPct val="100000"/>
+              </a:lnSpc>
+            </a:pPr>
+            <a:r>
+              <a:rPr b="1" lang="en-US" sz="4400">
+                <a:solidFill>
+                  <a:srgbClr val="ffc000"/>
+                </a:solidFill>
+                <a:latin typeface="Calibri"/>
+              </a:rPr>
+              <a:t>Support We Need</a:t>
+            </a:r>
+            <a:endParaRPr/>
+          </a:p>
+        </p:txBody>
+      </p:sp>
+      <p:sp>
+        <p:nvSpPr>
+          <p:cNvPr id="58" name="CustomShape 2"/>
+          <p:cNvSpPr/>
+          <p:nvPr/>
+        </p:nvSpPr>
+        <p:spPr>
+          <a:xfrm>
+            <a:off x="1371600" y="2364480"/>
+            <a:ext cx="6399000" cy="2298600"/>
+          </a:xfrm>
+          <a:prstGeom prst="rect">
+            <a:avLst/>
+          </a:prstGeom>
+        </p:spPr>
+        <p:txBody>
+          <a:bodyPr bIns="45000" lIns="90000" rIns="90000" tIns="45000"/>
+          <a:p>
+            <a:pPr algn="ctr">
+              <a:lnSpc>
+                <a:spcPct val="100000"/>
+              </a:lnSpc>
+            </a:pPr>
+            <a:r>
+              <a:rPr lang="en-US" sz="3200">
+                <a:solidFill>
+                  <a:srgbClr val="558ed5"/>
+                </a:solidFill>
+                <a:latin typeface="Calibri"/>
+              </a:rPr>
+              <a:t> </a:t>
+            </a:r>
+            <a:r>
+              <a:rPr lang="en-US" sz="3200">
+                <a:solidFill>
+                  <a:srgbClr val="558ed5"/>
+                </a:solidFill>
+                <a:latin typeface="Calibri"/>
+              </a:rPr>
+              <a:t>JSON / XML API for site data</a:t>
+            </a:r>
+            <a:endParaRPr/>
+          </a:p>
+          <a:p>
+            <a:pPr algn="ctr">
+              <a:lnSpc>
+                <a:spcPct val="100000"/>
+              </a:lnSpc>
+              <a:buFont typeface="StarSymbol"/>
+              <a:buChar char=""/>
+            </a:pPr>
+            <a:r>
+              <a:rPr lang="en-US" sz="3200">
+                <a:solidFill>
+                  <a:srgbClr val="558ed5"/>
+                </a:solidFill>
+                <a:latin typeface="Calibri"/>
+              </a:rPr>
+              <a:t> </a:t>
+            </a:r>
+            <a:r>
+              <a:rPr lang="en-US" sz="3200">
+                <a:solidFill>
+                  <a:srgbClr val="558ed5"/>
+                </a:solidFill>
+                <a:latin typeface="Calibri"/>
+              </a:rPr>
+              <a:t>Front page list of categories</a:t>
+            </a:r>
+            <a:endParaRPr/>
+          </a:p>
+          <a:p>
+            <a:pPr algn="ctr">
+              <a:lnSpc>
+                <a:spcPct val="100000"/>
+              </a:lnSpc>
+              <a:buFont typeface="StarSymbol"/>
+              <a:buChar char=""/>
+            </a:pPr>
+            <a:r>
+              <a:rPr lang="en-US" sz="3200">
+                <a:solidFill>
+                  <a:srgbClr val="558ed5"/>
+                </a:solidFill>
+                <a:latin typeface="Calibri"/>
+              </a:rPr>
+              <a:t> </a:t>
+            </a:r>
+            <a:r>
+              <a:rPr lang="en-US" sz="3200">
+                <a:solidFill>
+                  <a:srgbClr val="558ed5"/>
+                </a:solidFill>
+                <a:latin typeface="Calibri"/>
+              </a:rPr>
+              <a:t>Paged list of content in categories</a:t>
+            </a:r>
+            <a:endParaRPr/>
+          </a:p>
+          <a:p>
+            <a:pPr algn="ctr">
+              <a:lnSpc>
+                <a:spcPct val="100000"/>
+              </a:lnSpc>
+              <a:buFont typeface="StarSymbol"/>
+              <a:buChar char=""/>
+            </a:pPr>
+            <a:r>
+              <a:rPr lang="en-US" sz="3200">
+                <a:solidFill>
+                  <a:srgbClr val="558ed5"/>
+                </a:solidFill>
+                <a:latin typeface="Calibri"/>
+              </a:rPr>
+              <a:t>Blog Posts</a:t>
+            </a:r>
+            <a:r>
+              <a:rPr i="1" lang="en-US" sz="3200">
+                <a:solidFill>
+                  <a:srgbClr val="8b8b8b"/>
+                </a:solidFill>
+                <a:latin typeface="Calibri"/>
+              </a:rPr>
+              <a:t> </a:t>
+            </a:r>
+            <a:r>
+              <a:rPr lang="en-US" sz="3200">
+                <a:solidFill>
+                  <a:srgbClr val="8b8b8b"/>
+                </a:solidFill>
+                <a:latin typeface="Calibri"/>
+              </a:rPr>
+              <a:t>  </a:t>
+            </a:r>
+            <a:endParaRPr/>
+          </a:p>
+        </p:txBody>
+      </p:sp>
+    </p:spTree>
+  </p:cSld>
+  <p:transition>
+    <p:fade/>
+  </p:transition>
+  <p:timing>
+    <p:tnLst>
+      <p:par>
+        <p:cTn dur="indefinite" id="19" nodeType="tmRoot" restart="never">
+          <p:childTnLst>
+            <p:seq>
+              <p:cTn id="20" nodeType="mainSeq"/>
+              <p:prevCondLst>
+                <p:cond delay="0" evt="onPrev">
+                  <p:tgtEl>
+                    <p:sldTgt/>
+                  </p:tgtEl>
+                </p:cond>
+              </p:prevCondLst>
+              <p:nextCondLst>
+                <p:cond delay="0" evt="onNext">
+                  <p:tgtEl>
+                    <p:sldTgt/>
+                  </p:tgtEl>
+                </p:cond>
+              </p:nextCondLst>
+            </p:seq>
+          </p:childTnLst>
+        </p:cTn>
+      </p:par>
+    </p:tnLst>
+  </p:timing>
+</p:sld>
+</file>
+
+<file path=ppt/slides/slide11.xml><?xml version="1.0" encoding="utf-8"?>
+<p:sld xmlns:a="http://schemas.openxmlformats.org/drawingml/2006/main" xmlns:p="http://schemas.openxmlformats.org/presentationml/2006/main" xmlns:r="http://schemas.openxmlformats.org/officeDocument/2006/relationships">
+  <p:cSld>
+    <p:spTree>
+      <p:nvGrpSpPr>
+        <p:cNvPr id="1" name=""/>
+        <p:cNvGrpSpPr/>
+        <p:nvPr/>
+      </p:nvGrpSpPr>
+      <p:grpSpPr>
+        <a:xfrm>
+          <a:off x="0" y="0"/>
+          <a:ext cx="0" cy="0"/>
+          <a:chOff x="0" y="0"/>
+          <a:chExt cx="0" cy="0"/>
+        </a:xfrm>
+      </p:grpSpPr>
+      <p:sp>
+        <p:nvSpPr>
+          <p:cNvPr id="59" name="CustomShape 1"/>
+          <p:cNvSpPr/>
+          <p:nvPr/>
+        </p:nvSpPr>
+        <p:spPr>
+          <a:xfrm>
+            <a:off x="685800" y="457200"/>
+            <a:ext cx="7770600" cy="914040"/>
+          </a:xfrm>
+          <a:prstGeom prst="rect">
+            <a:avLst/>
+          </a:prstGeom>
+        </p:spPr>
+        <p:txBody>
+          <a:bodyPr anchor="ctr" bIns="45000" lIns="90000" rIns="90000" tIns="45000"/>
+          <a:p>
+            <a:pPr algn="ctr">
+              <a:lnSpc>
+                <a:spcPct val="100000"/>
+              </a:lnSpc>
+            </a:pPr>
+            <a:r>
+              <a:rPr b="1" lang="en-US" sz="4400">
+                <a:solidFill>
+                  <a:srgbClr val="ffc000"/>
+                </a:solidFill>
+                <a:latin typeface="Calibri"/>
+              </a:rPr>
+              <a:t>Team Details</a:t>
+            </a:r>
+            <a:endParaRPr/>
+          </a:p>
+        </p:txBody>
+      </p:sp>
+      <p:sp>
+        <p:nvSpPr>
+          <p:cNvPr id="60" name="CustomShape 2"/>
+          <p:cNvSpPr/>
+          <p:nvPr/>
+        </p:nvSpPr>
+        <p:spPr>
+          <a:xfrm>
+            <a:off x="0" y="1828800"/>
+            <a:ext cx="9143640" cy="2834280"/>
+          </a:xfrm>
+          <a:prstGeom prst="rect">
+            <a:avLst/>
+          </a:prstGeom>
+        </p:spPr>
+        <p:txBody>
+          <a:bodyPr bIns="45000" lIns="90000" rIns="90000" tIns="45000"/>
+          <a:p>
+            <a:pPr algn="ctr">
+              <a:lnSpc>
+                <a:spcPct val="100000"/>
+              </a:lnSpc>
+            </a:pPr>
+            <a:r>
+              <a:rPr lang="en-US" sz="3200">
+                <a:solidFill>
+                  <a:srgbClr val="558ed5"/>
+                </a:solidFill>
+                <a:latin typeface="Calibri"/>
+              </a:rPr>
+              <a:t>Aniruddha Adhikary </a:t>
+            </a:r>
+            <a:r>
+              <a:rPr lang="en-US" sz="2000">
+                <a:solidFill>
+                  <a:srgbClr val="558ed5"/>
+                </a:solidFill>
+                <a:latin typeface="Calibri"/>
+              </a:rPr>
+              <a:t>(aniruddha@adhikary.net)</a:t>
+            </a:r>
+            <a:endParaRPr/>
+          </a:p>
+          <a:p>
+            <a:pPr algn="ctr">
+              <a:lnSpc>
+                <a:spcPct val="100000"/>
+              </a:lnSpc>
+            </a:pPr>
+            <a:r>
+              <a:rPr lang="en-US" sz="3200">
+                <a:solidFill>
+                  <a:srgbClr val="558ed5"/>
+                </a:solidFill>
+                <a:latin typeface="Calibri"/>
+              </a:rPr>
+              <a:t>Ershadul Hakim Rayhan</a:t>
+            </a:r>
+            <a:endParaRPr/>
+          </a:p>
+          <a:p>
+            <a:pPr algn="ctr">
+              <a:lnSpc>
+                <a:spcPct val="100000"/>
+              </a:lnSpc>
+            </a:pPr>
+            <a:r>
+              <a:rPr lang="en-US" sz="3200">
+                <a:solidFill>
+                  <a:srgbClr val="558ed5"/>
+                </a:solidFill>
+                <a:latin typeface="Calibri"/>
+              </a:rPr>
+              <a:t>Iftekhar Mohammad</a:t>
+            </a:r>
+            <a:endParaRPr/>
+          </a:p>
+          <a:p>
+            <a:pPr algn="ctr">
+              <a:lnSpc>
+                <a:spcPct val="100000"/>
+              </a:lnSpc>
+            </a:pPr>
+            <a:endParaRPr/>
+          </a:p>
+          <a:p>
+            <a:pPr algn="ctr">
+              <a:lnSpc>
+                <a:spcPct val="100000"/>
+              </a:lnSpc>
+            </a:pPr>
+            <a:r>
+              <a:rPr lang="en-US" sz="3200">
+                <a:solidFill>
+                  <a:srgbClr val="558ed5"/>
+                </a:solidFill>
+                <a:latin typeface="Calibri"/>
+              </a:rPr>
+              <a:t>github.com/aniruddha-adhikary</a:t>
+            </a:r>
+            <a:endParaRPr/>
+          </a:p>
+          <a:p>
+            <a:pPr algn="ctr">
+              <a:lnSpc>
+                <a:spcPct val="100000"/>
+              </a:lnSpc>
+            </a:pPr>
+            <a:endParaRPr/>
+          </a:p>
+        </p:txBody>
+      </p:sp>
+    </p:spTree>
+  </p:cSld>
+  <p:transition>
+    <p:fade/>
+  </p:transition>
+  <p:timing>
+    <p:tnLst>
+      <p:par>
+        <p:cTn dur="indefinite" id="21" nodeType="tmRoot" restart="never">
+          <p:childTnLst>
+            <p:seq>
+              <p:cTn id="22" nodeType="mainSeq"/>
+              <p:prevCondLst>
+                <p:cond delay="0" evt="onPrev">
+                  <p:tgtEl>
+                    <p:sldTgt/>
+                  </p:tgtEl>
+                </p:cond>
+              </p:prevCondLst>
+              <p:nextCondLst>
+                <p:cond delay="0" evt="onNext">
+                  <p:tgtEl>
+                    <p:sldTgt/>
+                  </p:tgtEl>
+                </p:cond>
+              </p:nextCondLst>
+            </p:seq>
+          </p:childTnLst>
+        </p:cTn>
+      </p:par>
+    </p:tnLst>
+  </p:timing>
+</p:sld>
+</file>
+
+<file path=ppt/slides/slide12.xml><?xml version="1.0" encoding="utf-8"?>
+<p:sld xmlns:a="http://schemas.openxmlformats.org/drawingml/2006/main" xmlns:p="http://schemas.openxmlformats.org/presentationml/2006/main" xmlns:r="http://schemas.openxmlformats.org/officeDocument/2006/relationships">
+  <p:cSld>
+    <p:spTree>
+      <p:nvGrpSpPr>
+        <p:cNvPr id="1" name=""/>
+        <p:cNvGrpSpPr/>
+        <p:nvPr/>
+      </p:nvGrpSpPr>
+      <p:grpSpPr>
+        <a:xfrm>
+          <a:off x="0" y="0"/>
+          <a:ext cx="0" cy="0"/>
+          <a:chOff x="0" y="0"/>
+          <a:chExt cx="0" cy="0"/>
+        </a:xfrm>
+      </p:grpSpPr>
+      <p:sp>
+        <p:nvSpPr>
+          <p:cNvPr id="61" name="CustomShape 1"/>
+          <p:cNvSpPr/>
+          <p:nvPr/>
+        </p:nvSpPr>
+        <p:spPr>
+          <a:xfrm>
+            <a:off x="685800" y="457200"/>
+            <a:ext cx="7770600" cy="914040"/>
+          </a:xfrm>
+          <a:prstGeom prst="rect">
+            <a:avLst/>
+          </a:prstGeom>
+        </p:spPr>
+        <p:txBody>
+          <a:bodyPr anchor="ctr" bIns="45000" lIns="90000" rIns="90000" tIns="45000"/>
+          <a:p>
+            <a:pPr algn="ctr">
+              <a:lnSpc>
+                <a:spcPct val="100000"/>
+              </a:lnSpc>
+            </a:pPr>
+            <a:r>
+              <a:rPr b="1" lang="en-US" sz="4400">
+                <a:solidFill>
+                  <a:srgbClr val="ffc000"/>
+                </a:solidFill>
+                <a:latin typeface="Calibri"/>
+              </a:rPr>
+              <a:t>Team Details</a:t>
+            </a:r>
+            <a:endParaRPr/>
+          </a:p>
+        </p:txBody>
+      </p:sp>
+      <p:sp>
+        <p:nvSpPr>
+          <p:cNvPr id="62" name="CustomShape 2"/>
+          <p:cNvSpPr/>
+          <p:nvPr/>
+        </p:nvSpPr>
+        <p:spPr>
+          <a:xfrm>
+            <a:off x="0" y="1828800"/>
+            <a:ext cx="9143640" cy="2834280"/>
+          </a:xfrm>
+          <a:prstGeom prst="rect">
+            <a:avLst/>
+          </a:prstGeom>
+        </p:spPr>
+        <p:txBody>
+          <a:bodyPr bIns="45000" lIns="90000" rIns="90000" tIns="45000"/>
+          <a:p>
+            <a:pPr algn="ctr">
+              <a:lnSpc>
+                <a:spcPct val="100000"/>
+              </a:lnSpc>
+            </a:pPr>
+            <a:r>
+              <a:rPr lang="en-US" sz="3200">
+                <a:solidFill>
+                  <a:srgbClr val="558ed5"/>
+                </a:solidFill>
+                <a:latin typeface="Calibri"/>
+              </a:rPr>
+              <a:t>Aniruddha Adhikary </a:t>
+            </a:r>
+            <a:r>
+              <a:rPr lang="en-US" sz="2000">
+                <a:solidFill>
+                  <a:srgbClr val="558ed5"/>
+                </a:solidFill>
+                <a:latin typeface="Calibri"/>
+              </a:rPr>
+              <a:t>(aniruddha@adhikary.net)</a:t>
+            </a:r>
+            <a:endParaRPr/>
+          </a:p>
+          <a:p>
+            <a:pPr algn="ctr">
+              <a:lnSpc>
+                <a:spcPct val="100000"/>
+              </a:lnSpc>
+            </a:pPr>
+            <a:r>
+              <a:rPr lang="en-US" sz="3200">
+                <a:solidFill>
+                  <a:srgbClr val="558ed5"/>
+                </a:solidFill>
+                <a:latin typeface="Calibri"/>
+              </a:rPr>
+              <a:t>Ershadul Hakim Rayhan</a:t>
+            </a:r>
+            <a:endParaRPr/>
+          </a:p>
+          <a:p>
+            <a:pPr algn="ctr">
+              <a:lnSpc>
+                <a:spcPct val="100000"/>
+              </a:lnSpc>
+            </a:pPr>
+            <a:r>
+              <a:rPr lang="en-US" sz="3200">
+                <a:solidFill>
+                  <a:srgbClr val="558ed5"/>
+                </a:solidFill>
+                <a:latin typeface="Calibri"/>
+              </a:rPr>
+              <a:t>Iftekhar Mohammad</a:t>
+            </a:r>
+            <a:endParaRPr/>
+          </a:p>
+          <a:p>
+            <a:pPr algn="ctr">
+              <a:lnSpc>
+                <a:spcPct val="100000"/>
+              </a:lnSpc>
+            </a:pPr>
+            <a:endParaRPr/>
+          </a:p>
+          <a:p>
+            <a:pPr algn="ctr">
+              <a:lnSpc>
+                <a:spcPct val="100000"/>
+              </a:lnSpc>
+            </a:pPr>
+            <a:r>
+              <a:rPr lang="en-US" sz="3200">
+                <a:solidFill>
+                  <a:srgbClr val="558ed5"/>
+                </a:solidFill>
+                <a:latin typeface="Calibri"/>
+              </a:rPr>
+              <a:t>github.com/aniruddha-adhikary</a:t>
+            </a:r>
+            <a:endParaRPr/>
+          </a:p>
+          <a:p>
+            <a:pPr algn="ctr">
+              <a:lnSpc>
+                <a:spcPct val="100000"/>
+              </a:lnSpc>
+            </a:pPr>
+            <a:endParaRPr/>
+          </a:p>
+        </p:txBody>
+      </p:sp>
+    </p:spTree>
+  </p:cSld>
+  <p:transition>
+    <p:fade/>
+  </p:transition>
+  <p:timing>
+    <p:tnLst>
+      <p:par>
+        <p:cTn dur="indefinite" id="23" nodeType="tmRoot" restart="never">
+          <p:childTnLst>
+            <p:seq>
+              <p:cTn id="24" nodeType="mainSeq"/>
               <p:prevCondLst>
                 <p:cond delay="0" evt="onPrev">
                   <p:tgtEl>
@@ -1488,7 +2107,7 @@
         <p:spPr>
           <a:xfrm>
             <a:off x="685800" y="1047600"/>
-            <a:ext cx="7771320" cy="1101600"/>
+            <a:ext cx="7770600" cy="1100880"/>
           </a:xfrm>
           <a:prstGeom prst="rect">
             <a:avLst/>
@@ -1505,7 +2124,7 @@
             <a:r>
               <a:rPr b="1" lang="en-US" sz="4400">
                 <a:solidFill>
-                  <a:srgbClr val="ffc000"/>
+                  <a:srgbClr val="ff420e"/>
                 </a:solidFill>
                 <a:latin typeface="Calibri"/>
               </a:rPr>
@@ -1524,7 +2143,7 @@
         <p:spPr>
           <a:xfrm>
             <a:off x="1371600" y="2364480"/>
-            <a:ext cx="6399720" cy="1750320"/>
+            <a:ext cx="6399000" cy="1749600"/>
           </a:xfrm>
           <a:prstGeom prst="rect">
             <a:avLst/>
@@ -1541,7 +2160,7 @@
             <a:r>
               <a:rPr lang="en-US" sz="3200">
                 <a:solidFill>
-                  <a:srgbClr val="558ed5"/>
+                  <a:srgbClr val="993366"/>
                 </a:solidFill>
                 <a:latin typeface="Calibri"/>
               </a:rPr>
@@ -1612,7 +2231,7 @@
         <p:spPr>
           <a:xfrm>
             <a:off x="685800" y="514440"/>
-            <a:ext cx="7771320" cy="1101600"/>
+            <a:ext cx="7770600" cy="1100880"/>
           </a:xfrm>
           <a:prstGeom prst="rect">
             <a:avLst/>
@@ -1648,7 +2267,7 @@
         <p:spPr>
           <a:xfrm>
             <a:off x="822960" y="1828800"/>
-            <a:ext cx="7405920" cy="3775680"/>
+            <a:ext cx="7405200" cy="3774960"/>
           </a:xfrm>
           <a:prstGeom prst="rect">
             <a:avLst/>
@@ -1665,13 +2284,13 @@
               <a:buChar char="•"/>
             </a:pPr>
             <a:r>
-              <a:rPr i="1" lang="en-US" sz="2200">
-                <a:solidFill>
-                  <a:srgbClr val="8b8b8b"/>
-                </a:solidFill>
-                <a:latin typeface="Calibri"/>
-              </a:rPr>
-              <a:t>Get instant notification on device</a:t>
+              <a:rPr lang="en-US" sz="2200">
+                <a:solidFill>
+                  <a:srgbClr val="000000"/>
+                </a:solidFill>
+                <a:latin typeface="Calibri"/>
+              </a:rPr>
+              <a:t>Instant notification on device</a:t>
             </a:r>
             <a:endParaRPr/>
           </a:p>
@@ -1684,13 +2303,13 @@
               <a:buChar char="•"/>
             </a:pPr>
             <a:r>
-              <a:rPr i="1" lang="en-US" sz="2200">
-                <a:solidFill>
-                  <a:srgbClr val="8b8b8b"/>
-                </a:solidFill>
-                <a:latin typeface="Calibri"/>
-              </a:rPr>
-              <a:t>Preview, comment and rate presentations</a:t>
+              <a:rPr lang="en-US" sz="2200">
+                <a:solidFill>
+                  <a:srgbClr val="000000"/>
+                </a:solidFill>
+                <a:latin typeface="Calibri"/>
+              </a:rPr>
+              <a:t>Preview, Comment and rate presentations and blog post</a:t>
             </a:r>
             <a:endParaRPr/>
           </a:p>
@@ -1703,9 +2322,9 @@
               <a:buChar char="•"/>
             </a:pPr>
             <a:r>
-              <a:rPr i="1" lang="en-US" sz="2200">
-                <a:solidFill>
-                  <a:srgbClr val="8b8b8b"/>
+              <a:rPr lang="en-US" sz="2200">
+                <a:solidFill>
+                  <a:srgbClr val="000000"/>
                 </a:solidFill>
                 <a:latin typeface="Calibri"/>
               </a:rPr>
@@ -1722,9 +2341,9 @@
               <a:buChar char="•"/>
             </a:pPr>
             <a:r>
-              <a:rPr i="1" lang="en-US" sz="2200">
-                <a:solidFill>
-                  <a:srgbClr val="8b8b8b"/>
+              <a:rPr lang="en-US" sz="2200">
+                <a:solidFill>
+                  <a:srgbClr val="000000"/>
                 </a:solidFill>
                 <a:latin typeface="Calibri"/>
               </a:rPr>
@@ -1794,8 +2413,8 @@
         </p:nvSpPr>
         <p:spPr>
           <a:xfrm>
-            <a:off x="685800" y="1047600"/>
-            <a:ext cx="7771320" cy="1101600"/>
+            <a:off x="685800" y="291600"/>
+            <a:ext cx="4708800" cy="1100880"/>
           </a:xfrm>
           <a:prstGeom prst="rect">
             <a:avLst/>
@@ -1816,138 +2435,62 @@
                 </a:solidFill>
                 <a:latin typeface="Calibri"/>
               </a:rPr>
-              <a:t>What we developed in GDG</a:t>
-            </a:r>
-            <a:endParaRPr/>
-          </a:p>
-        </p:txBody>
-      </p:sp>
-      <p:sp>
-        <p:nvSpPr>
-          <p:cNvPr id="41" name="CustomShape 2"/>
+              <a:t>Main Activity</a:t>
+            </a:r>
+            <a:endParaRPr/>
+          </a:p>
+        </p:txBody>
+      </p:sp>
+      <p:pic>
+        <p:nvPicPr>
+          <p:cNvPr descr="" id="41" name=""/>
+          <p:cNvPicPr/>
+          <p:nvPr/>
+        </p:nvPicPr>
+        <p:blipFill>
+          <a:blip r:embed="rId1"/>
+          <a:stretch>
+            <a:fillRect/>
+          </a:stretch>
+        </p:blipFill>
+        <p:spPr>
+          <a:xfrm>
+            <a:off x="5852160" y="640080"/>
+            <a:ext cx="2827800" cy="4023000"/>
+          </a:xfrm>
+          <a:prstGeom prst="rect">
+            <a:avLst/>
+          </a:prstGeom>
+        </p:spPr>
+      </p:pic>
+      <p:sp>
+        <p:nvSpPr>
+          <p:cNvPr id="42" name="CustomShape 2"/>
           <p:cNvSpPr/>
           <p:nvPr/>
         </p:nvSpPr>
         <p:spPr>
           <a:xfrm>
-            <a:off x="3124080" y="3308760"/>
-            <a:ext cx="2894400" cy="1458360"/>
-          </a:xfrm>
-          <a:prstGeom prst="rect">
-            <a:avLst/>
-          </a:prstGeom>
-        </p:spPr>
-        <p:txBody>
-          <a:bodyPr bIns="45000" lIns="90000" rIns="90000" tIns="45000"/>
-          <a:p>
-            <a:pPr>
-              <a:lnSpc>
-                <a:spcPct val="100000"/>
-              </a:lnSpc>
-              <a:buFont typeface="Arial"/>
-              <a:buChar char="•"/>
-            </a:pPr>
-            <a:r>
-              <a:rPr i="1" lang="en-US" sz="1500">
-                <a:solidFill>
-                  <a:srgbClr val="8b8b8b"/>
-                </a:solidFill>
-                <a:latin typeface="Calibri"/>
-              </a:rPr>
-              <a:t> </a:t>
-            </a:r>
-            <a:r>
-              <a:rPr i="1" lang="en-US" sz="1500">
-                <a:solidFill>
-                  <a:srgbClr val="8b8b8b"/>
-                </a:solidFill>
-                <a:latin typeface="Calibri"/>
-              </a:rPr>
-              <a:t>DFD</a:t>
-            </a:r>
-            <a:endParaRPr/>
-          </a:p>
-          <a:p>
-            <a:pPr>
-              <a:lnSpc>
-                <a:spcPct val="100000"/>
-              </a:lnSpc>
-              <a:buFont typeface="Arial"/>
-              <a:buChar char="•"/>
-            </a:pPr>
-            <a:r>
-              <a:rPr i="1" lang="en-US" sz="1500">
-                <a:solidFill>
-                  <a:srgbClr val="8b8b8b"/>
-                </a:solidFill>
-                <a:latin typeface="Calibri"/>
-              </a:rPr>
-              <a:t> </a:t>
-            </a:r>
-            <a:r>
-              <a:rPr i="1" lang="en-US" sz="1500">
-                <a:solidFill>
-                  <a:srgbClr val="8b8b8b"/>
-                </a:solidFill>
-                <a:latin typeface="Calibri"/>
-              </a:rPr>
-              <a:t>Wireframe for first 3 features</a:t>
-            </a:r>
-            <a:endParaRPr/>
-          </a:p>
-          <a:p>
-            <a:pPr>
-              <a:lnSpc>
-                <a:spcPct val="100000"/>
-              </a:lnSpc>
-              <a:buFont typeface="Arial"/>
-              <a:buChar char="•"/>
-            </a:pPr>
-            <a:r>
-              <a:rPr i="1" lang="en-US" sz="1500">
-                <a:solidFill>
-                  <a:srgbClr val="8b8b8b"/>
-                </a:solidFill>
-                <a:latin typeface="Calibri"/>
-              </a:rPr>
-              <a:t> </a:t>
-            </a:r>
-            <a:r>
-              <a:rPr i="1" lang="en-US" sz="1500">
-                <a:solidFill>
-                  <a:srgbClr val="8b8b8b"/>
-                </a:solidFill>
-                <a:latin typeface="Calibri"/>
-              </a:rPr>
-              <a:t>Graphics for the 1st feature</a:t>
-            </a:r>
-            <a:endParaRPr/>
-          </a:p>
-          <a:p>
-            <a:pPr>
-              <a:lnSpc>
-                <a:spcPct val="100000"/>
-              </a:lnSpc>
-              <a:buFont typeface="Arial"/>
-              <a:buChar char="•"/>
-            </a:pPr>
-            <a:r>
-              <a:rPr i="1" lang="en-US" sz="1500">
-                <a:solidFill>
-                  <a:srgbClr val="8b8b8b"/>
-                </a:solidFill>
-                <a:latin typeface="Calibri"/>
-              </a:rPr>
-              <a:t> </a:t>
-            </a:r>
-            <a:r>
-              <a:rPr i="1" lang="en-US" sz="1500">
-                <a:solidFill>
-                  <a:srgbClr val="8b8b8b"/>
-                </a:solidFill>
-                <a:latin typeface="Calibri"/>
-              </a:rPr>
-              <a:t>etc</a:t>
+            <a:off x="1029240" y="1828800"/>
+            <a:ext cx="4456800" cy="1737000"/>
+          </a:xfrm>
+          <a:prstGeom prst="rect">
+            <a:avLst/>
+          </a:prstGeom>
+        </p:spPr>
+        <p:txBody>
+          <a:bodyPr bIns="45000" lIns="90000" rIns="90000" tIns="45000" wrap="none"/>
+          <a:p>
+            <a:r>
+              <a:rPr lang="en-US" sz="2800"/>
+              <a:t>Activity displaying the list</a:t>
+            </a:r>
+            <a:endParaRPr/>
+          </a:p>
+          <a:p>
+            <a:r>
+              <a:rPr lang="en-US" sz="2800"/>
+              <a:t>of presentation categories</a:t>
             </a:r>
             <a:endParaRPr/>
           </a:p>
@@ -2007,14 +2550,14 @@
       </p:grpSpPr>
       <p:sp>
         <p:nvSpPr>
-          <p:cNvPr id="42" name="CustomShape 1"/>
+          <p:cNvPr id="43" name="CustomShape 1"/>
           <p:cNvSpPr/>
           <p:nvPr/>
         </p:nvSpPr>
         <p:spPr>
           <a:xfrm>
-            <a:off x="685800" y="-95400"/>
-            <a:ext cx="7771320" cy="1101600"/>
+            <a:off x="685800" y="291600"/>
+            <a:ext cx="4708800" cy="1100880"/>
           </a:xfrm>
           <a:prstGeom prst="rect">
             <a:avLst/>
@@ -2035,79 +2578,92 @@
                 </a:solidFill>
                 <a:latin typeface="Calibri"/>
               </a:rPr>
-              <a:t>What we developed in GDG</a:t>
-            </a:r>
-            <a:endParaRPr/>
-          </a:p>
-        </p:txBody>
-      </p:sp>
-      <p:sp>
-        <p:nvSpPr>
-          <p:cNvPr id="43" name="CustomShape 2"/>
+              <a:t>Browsing</a:t>
+            </a:r>
+            <a:endParaRPr/>
+          </a:p>
+        </p:txBody>
+      </p:sp>
+      <p:sp>
+        <p:nvSpPr>
+          <p:cNvPr id="44" name="CustomShape 2"/>
           <p:cNvSpPr/>
           <p:nvPr/>
         </p:nvSpPr>
         <p:spPr>
           <a:xfrm>
-            <a:off x="1371600" y="2364480"/>
-            <a:ext cx="6399720" cy="1313280"/>
-          </a:xfrm>
-          <a:prstGeom prst="rect">
-            <a:avLst/>
-          </a:prstGeom>
-        </p:spPr>
-        <p:txBody>
-          <a:bodyPr bIns="45000" lIns="90000" rIns="90000" tIns="45000"/>
-          <a:p>
-            <a:pPr algn="ctr">
-              <a:lnSpc>
-                <a:spcPct val="100000"/>
-              </a:lnSpc>
-            </a:pPr>
-            <a:r>
-              <a:rPr lang="en-US" sz="3200">
-                <a:solidFill>
-                  <a:srgbClr val="558ed5"/>
-                </a:solidFill>
-                <a:latin typeface="Calibri"/>
-              </a:rPr>
-              <a:t>(Add 3 to 15 screen shots </a:t>
-            </a:r>
-            <a:endParaRPr/>
-          </a:p>
-          <a:p>
-            <a:pPr algn="ctr">
-              <a:lnSpc>
-                <a:spcPct val="100000"/>
-              </a:lnSpc>
-            </a:pPr>
-            <a:r>
-              <a:rPr lang="en-US" sz="3200">
-                <a:solidFill>
-                  <a:srgbClr val="558ed5"/>
-                </a:solidFill>
-                <a:latin typeface="Calibri"/>
-              </a:rPr>
-              <a:t>in consecutive slides)</a:t>
-            </a:r>
-            <a:r>
-              <a:rPr lang="en-US" sz="3200">
-                <a:solidFill>
-                  <a:srgbClr val="8b8b8b"/>
-                </a:solidFill>
-                <a:latin typeface="Calibri"/>
-              </a:rPr>
-              <a:t>  </a:t>
-            </a:r>
-            <a:endParaRPr/>
-          </a:p>
-        </p:txBody>
-      </p:sp>
+            <a:off x="1029240" y="1828800"/>
+            <a:ext cx="4456800" cy="1737000"/>
+          </a:xfrm>
+          <a:prstGeom prst="rect">
+            <a:avLst/>
+          </a:prstGeom>
+        </p:spPr>
+        <p:txBody>
+          <a:bodyPr bIns="45000" lIns="90000" rIns="90000" tIns="45000" wrap="none"/>
+          <a:p>
+            <a:r>
+              <a:rPr lang="en-US" sz="2800"/>
+              <a:t>Presentation listing</a:t>
+            </a:r>
+            <a:endParaRPr/>
+          </a:p>
+        </p:txBody>
+      </p:sp>
+      <p:pic>
+        <p:nvPicPr>
+          <p:cNvPr descr="" id="45" name=""/>
+          <p:cNvPicPr/>
+          <p:nvPr/>
+        </p:nvPicPr>
+        <p:blipFill>
+          <a:blip r:embed="rId1"/>
+          <a:stretch>
+            <a:fillRect/>
+          </a:stretch>
+        </p:blipFill>
+        <p:spPr>
+          <a:xfrm>
+            <a:off x="5669280" y="539640"/>
+            <a:ext cx="2892960" cy="4214880"/>
+          </a:xfrm>
+          <a:prstGeom prst="rect">
+            <a:avLst/>
+          </a:prstGeom>
+        </p:spPr>
+      </p:pic>
     </p:spTree>
   </p:cSld>
   <p:transition>
     <p:fade/>
   </p:transition>
+  <p:timing>
+    <p:tnLst>
+      <p:par>
+        <p:cTn dur="indefinite" id="9" nodeType="tmRoot" restart="never">
+          <p:childTnLst>
+            <p:seq>
+              <p:cTn id="10" nodeType="mainSeq"/>
+              <p:prevCondLst>
+                <p:cond delay="0" evt="onPrev">
+                  <p:tgtEl>
+                    <p:sldTgt/>
+                  </p:tgtEl>
+                </p:cond>
+              </p:prevCondLst>
+              <p:nextCondLst>
+                <p:cond delay="0" evt="onNext">
+                  <p:tgtEl>
+                    <p:sldTgt/>
+                  </p:tgtEl>
+                </p:cond>
+              </p:nextCondLst>
+            </p:seq>
+          </p:childTnLst>
+        </p:cTn>
+      </p:par>
+    </p:tnLst>
+  </p:timing>
 </p:sld>
 </file>
 
@@ -2130,14 +2686,14 @@
       </p:grpSpPr>
       <p:sp>
         <p:nvSpPr>
-          <p:cNvPr id="44" name="CustomShape 1"/>
+          <p:cNvPr id="46" name="CustomShape 1"/>
           <p:cNvSpPr/>
           <p:nvPr/>
         </p:nvSpPr>
         <p:spPr>
           <a:xfrm>
-            <a:off x="685800" y="209520"/>
-            <a:ext cx="7771320" cy="1101600"/>
+            <a:off x="4206240" y="291600"/>
+            <a:ext cx="4480200" cy="1100880"/>
           </a:xfrm>
           <a:prstGeom prst="rect">
             <a:avLst/>
@@ -2158,191 +2714,55 @@
                 </a:solidFill>
                 <a:latin typeface="Calibri"/>
               </a:rPr>
-              <a:t>Final Vision</a:t>
-            </a:r>
-            <a:endParaRPr/>
-          </a:p>
-        </p:txBody>
-      </p:sp>
-      <p:sp>
-        <p:nvSpPr>
-          <p:cNvPr id="45" name="CustomShape 2"/>
+              <a:t>Notifications</a:t>
+            </a:r>
+            <a:endParaRPr/>
+          </a:p>
+        </p:txBody>
+      </p:sp>
+      <p:pic>
+        <p:nvPicPr>
+          <p:cNvPr descr="" id="47" name=""/>
+          <p:cNvPicPr/>
+          <p:nvPr/>
+        </p:nvPicPr>
+        <p:blipFill>
+          <a:blip r:embed="rId1"/>
+          <a:stretch>
+            <a:fillRect/>
+          </a:stretch>
+        </p:blipFill>
+        <p:spPr>
+          <a:xfrm>
+            <a:off x="274320" y="274320"/>
+            <a:ext cx="2923920" cy="4662720"/>
+          </a:xfrm>
+          <a:prstGeom prst="rect">
+            <a:avLst/>
+          </a:prstGeom>
+        </p:spPr>
+      </p:pic>
+      <p:sp>
+        <p:nvSpPr>
+          <p:cNvPr id="48" name="CustomShape 2"/>
           <p:cNvSpPr/>
           <p:nvPr/>
         </p:nvSpPr>
         <p:spPr>
           <a:xfrm>
-            <a:off x="1371600" y="1526400"/>
-            <a:ext cx="6399720" cy="1313280"/>
-          </a:xfrm>
-          <a:prstGeom prst="rect">
-            <a:avLst/>
-          </a:prstGeom>
-        </p:spPr>
-        <p:txBody>
-          <a:bodyPr bIns="45000" lIns="90000" rIns="90000" tIns="45000"/>
-          <a:p>
-            <a:pPr algn="ctr">
-              <a:lnSpc>
-                <a:spcPct val="100000"/>
-              </a:lnSpc>
-            </a:pPr>
-            <a:r>
-              <a:rPr lang="en-US" sz="3200">
-                <a:solidFill>
-                  <a:srgbClr val="558ed5"/>
-                </a:solidFill>
-                <a:latin typeface="Calibri"/>
-              </a:rPr>
-              <a:t>(What will your final product consist of? How long will it take to deliver?)</a:t>
-            </a:r>
-            <a:endParaRPr/>
-          </a:p>
-          <a:p>
-            <a:pPr algn="ctr">
-              <a:lnSpc>
-                <a:spcPct val="100000"/>
-              </a:lnSpc>
-            </a:pPr>
-            <a:r>
-              <a:rPr i="1" lang="en-US" sz="3200">
-                <a:solidFill>
-                  <a:srgbClr val="8b8b8b"/>
-                </a:solidFill>
-                <a:latin typeface="Calibri"/>
-              </a:rPr>
-              <a:t>Ex. </a:t>
-            </a:r>
-            <a:r>
-              <a:rPr lang="en-US" sz="3200">
-                <a:solidFill>
-                  <a:srgbClr val="8b8b8b"/>
-                </a:solidFill>
-                <a:latin typeface="Calibri"/>
-              </a:rPr>
-              <a:t>  </a:t>
-            </a:r>
-            <a:endParaRPr/>
-          </a:p>
-        </p:txBody>
-      </p:sp>
-      <p:sp>
-        <p:nvSpPr>
-          <p:cNvPr id="46" name="CustomShape 3"/>
-          <p:cNvSpPr/>
-          <p:nvPr/>
-        </p:nvSpPr>
-        <p:spPr>
-          <a:xfrm>
-            <a:off x="3352680" y="2952720"/>
-            <a:ext cx="2437200" cy="1001880"/>
-          </a:xfrm>
-          <a:prstGeom prst="rect">
-            <a:avLst/>
-          </a:prstGeom>
-        </p:spPr>
-        <p:txBody>
-          <a:bodyPr bIns="45000" lIns="90000" rIns="90000" tIns="45000"/>
-          <a:p>
-            <a:pPr>
-              <a:lnSpc>
-                <a:spcPct val="100000"/>
-              </a:lnSpc>
-              <a:buFont typeface="Arial"/>
-              <a:buChar char="•"/>
-            </a:pPr>
-            <a:r>
-              <a:rPr i="1" lang="en-US" sz="1500">
-                <a:solidFill>
-                  <a:srgbClr val="8b8b8b"/>
-                </a:solidFill>
-                <a:latin typeface="Calibri"/>
-              </a:rPr>
-              <a:t> </a:t>
-            </a:r>
-            <a:r>
-              <a:rPr i="1" lang="en-US" sz="1500">
-                <a:solidFill>
-                  <a:srgbClr val="8b8b8b"/>
-                </a:solidFill>
-                <a:latin typeface="Calibri"/>
-              </a:rPr>
-              <a:t>National agricultural map</a:t>
-            </a:r>
-            <a:endParaRPr/>
-          </a:p>
-          <a:p>
-            <a:pPr>
-              <a:lnSpc>
-                <a:spcPct val="100000"/>
-              </a:lnSpc>
-              <a:buFont typeface="Arial"/>
-              <a:buChar char="•"/>
-            </a:pPr>
-            <a:r>
-              <a:rPr i="1" lang="en-US" sz="1500">
-                <a:solidFill>
-                  <a:srgbClr val="8b8b8b"/>
-                </a:solidFill>
-                <a:latin typeface="Calibri"/>
-              </a:rPr>
-              <a:t> </a:t>
-            </a:r>
-            <a:r>
-              <a:rPr i="1" lang="en-US" sz="1500">
-                <a:solidFill>
-                  <a:srgbClr val="8b8b8b"/>
-                </a:solidFill>
-                <a:latin typeface="Calibri"/>
-              </a:rPr>
-              <a:t>Synchronized transaction</a:t>
-            </a:r>
-            <a:endParaRPr/>
-          </a:p>
-        </p:txBody>
-      </p:sp>
-      <p:sp>
-        <p:nvSpPr>
-          <p:cNvPr id="47" name="CustomShape 4"/>
-          <p:cNvSpPr/>
-          <p:nvPr/>
-        </p:nvSpPr>
-        <p:spPr>
-          <a:xfrm>
-            <a:off x="3352680" y="3486240"/>
-            <a:ext cx="2437200" cy="317880"/>
-          </a:xfrm>
-          <a:prstGeom prst="rect">
-            <a:avLst/>
-          </a:prstGeom>
-        </p:spPr>
-        <p:txBody>
-          <a:bodyPr bIns="45000" lIns="90000" rIns="90000" tIns="45000"/>
-          <a:p>
-            <a:pPr>
-              <a:lnSpc>
-                <a:spcPct val="100000"/>
-              </a:lnSpc>
-              <a:buFont typeface="Arial"/>
-              <a:buChar char="•"/>
-            </a:pPr>
-            <a:r>
-              <a:rPr i="1" lang="en-US" sz="1500">
-                <a:solidFill>
-                  <a:srgbClr val="8b8b8b"/>
-                </a:solidFill>
-                <a:latin typeface="Calibri"/>
-              </a:rPr>
-              <a:t> </a:t>
-            </a:r>
-            <a:r>
-              <a:rPr i="1" lang="en-US" sz="1500">
-                <a:solidFill>
-                  <a:srgbClr val="8b8b8b"/>
-                </a:solidFill>
-                <a:latin typeface="Calibri"/>
-              </a:rPr>
-              <a:t>90 Working Days</a:t>
+            <a:off x="4114800" y="1828800"/>
+            <a:ext cx="4456800" cy="1737000"/>
+          </a:xfrm>
+          <a:prstGeom prst="rect">
+            <a:avLst/>
+          </a:prstGeom>
+        </p:spPr>
+        <p:txBody>
+          <a:bodyPr bIns="45000" lIns="90000" rIns="90000" tIns="45000" wrap="none"/>
+          <a:p>
+            <a:r>
+              <a:rPr lang="en-US" sz="2800"/>
+              <a:t>Default Android Notifications and a quick one click notification access button.</a:t>
             </a:r>
             <a:endParaRPr/>
           </a:p>
@@ -2353,6 +2773,33 @@
   <p:transition>
     <p:fade/>
   </p:transition>
+  <p:timing>
+    <p:tnLst>
+      <p:par>
+        <p:cTn dur="indefinite" id="11" nodeType="tmRoot" restart="never">
+          <p:childTnLst>
+            <p:seq>
+              <p:cTn id="12" nodeType="mainSeq"/>
+              <p:prevCondLst>
+                <p:cond delay="0" evt="onPrev">
+                  <p:tgtEl>
+                    <p:sldTgt/>
+                  </p:tgtEl>
+                </p:cond>
+              </p:prevCondLst>
+              <p:nextCondLst>
+                <p:cond delay="0" evt="onNext">
+                  <p:tgtEl>
+                    <p:sldTgt/>
+                  </p:tgtEl>
+                </p:cond>
+              </p:nextCondLst>
+            </p:seq>
+          </p:childTnLst>
+        </p:cTn>
+      </p:par>
+    </p:tnLst>
+  </p:timing>
 </p:sld>
 </file>
 
@@ -2375,14 +2822,14 @@
       </p:grpSpPr>
       <p:sp>
         <p:nvSpPr>
-          <p:cNvPr id="48" name="CustomShape 1"/>
+          <p:cNvPr id="49" name="CustomShape 1"/>
           <p:cNvSpPr/>
           <p:nvPr/>
         </p:nvSpPr>
         <p:spPr>
           <a:xfrm>
-            <a:off x="685800" y="1047600"/>
-            <a:ext cx="7771320" cy="1101600"/>
+            <a:off x="685800" y="291600"/>
+            <a:ext cx="4708800" cy="1100880"/>
           </a:xfrm>
           <a:prstGeom prst="rect">
             <a:avLst/>
@@ -2403,69 +2850,62 @@
                 </a:solidFill>
                 <a:latin typeface="Calibri"/>
               </a:rPr>
-              <a:t>Supports We Need</a:t>
-            </a:r>
-            <a:endParaRPr/>
-          </a:p>
-        </p:txBody>
-      </p:sp>
-      <p:sp>
-        <p:nvSpPr>
-          <p:cNvPr id="49" name="CustomShape 2"/>
+              <a:t>Viewer</a:t>
+            </a:r>
+            <a:endParaRPr/>
+          </a:p>
+        </p:txBody>
+      </p:sp>
+      <p:pic>
+        <p:nvPicPr>
+          <p:cNvPr descr="" id="50" name=""/>
+          <p:cNvPicPr/>
+          <p:nvPr/>
+        </p:nvPicPr>
+        <p:blipFill>
+          <a:blip r:embed="rId1"/>
+          <a:stretch>
+            <a:fillRect/>
+          </a:stretch>
+        </p:blipFill>
+        <p:spPr>
+          <a:xfrm>
+            <a:off x="5669280" y="274320"/>
+            <a:ext cx="3017160" cy="4388400"/>
+          </a:xfrm>
+          <a:prstGeom prst="rect">
+            <a:avLst/>
+          </a:prstGeom>
+        </p:spPr>
+      </p:pic>
+      <p:sp>
+        <p:nvSpPr>
+          <p:cNvPr id="51" name="CustomShape 2"/>
           <p:cNvSpPr/>
           <p:nvPr/>
         </p:nvSpPr>
         <p:spPr>
           <a:xfrm>
-            <a:off x="1371600" y="2364480"/>
-            <a:ext cx="6399720" cy="1313280"/>
-          </a:xfrm>
-          <a:prstGeom prst="rect">
-            <a:avLst/>
-          </a:prstGeom>
-        </p:spPr>
-        <p:txBody>
-          <a:bodyPr bIns="45000" lIns="90000" rIns="90000" tIns="45000"/>
-          <a:p>
-            <a:pPr algn="ctr">
-              <a:lnSpc>
-                <a:spcPct val="100000"/>
-              </a:lnSpc>
-            </a:pPr>
-            <a:r>
-              <a:rPr lang="en-US" sz="3200">
-                <a:solidFill>
-                  <a:srgbClr val="558ed5"/>
-                </a:solidFill>
-                <a:latin typeface="Calibri"/>
-              </a:rPr>
-              <a:t>(What support do you need to deliver the final product?)</a:t>
-            </a:r>
-            <a:endParaRPr/>
-          </a:p>
-          <a:p>
-            <a:pPr algn="ctr">
-              <a:lnSpc>
-                <a:spcPct val="100000"/>
-              </a:lnSpc>
-            </a:pPr>
-            <a:r>
-              <a:rPr i="1" lang="en-US" sz="3200">
-                <a:solidFill>
-                  <a:srgbClr val="8b8b8b"/>
-                </a:solidFill>
-                <a:latin typeface="Calibri"/>
-              </a:rPr>
-              <a:t>Ex. APIs, Database Access, Partnerships etc. </a:t>
-            </a:r>
-            <a:r>
-              <a:rPr lang="en-US" sz="3200">
-                <a:solidFill>
-                  <a:srgbClr val="8b8b8b"/>
-                </a:solidFill>
-                <a:latin typeface="Calibri"/>
-              </a:rPr>
-              <a:t>  </a:t>
+            <a:off x="1029600" y="1828800"/>
+            <a:ext cx="4456800" cy="1737000"/>
+          </a:xfrm>
+          <a:prstGeom prst="rect">
+            <a:avLst/>
+          </a:prstGeom>
+        </p:spPr>
+        <p:txBody>
+          <a:bodyPr bIns="45000" lIns="90000" rIns="90000" tIns="45000" wrap="none"/>
+          <a:p>
+            <a:r>
+              <a:rPr lang="en-US" sz="2800"/>
+              <a:t>Click on presentation and</a:t>
+            </a:r>
+            <a:endParaRPr/>
+          </a:p>
+          <a:p>
+            <a:r>
+              <a:rPr lang="en-US" sz="2800"/>
+              <a:t>preview that on a third-party viewer. Rate and comment to engage.</a:t>
             </a:r>
             <a:endParaRPr/>
           </a:p>
@@ -2476,6 +2916,33 @@
   <p:transition>
     <p:fade/>
   </p:transition>
+  <p:timing>
+    <p:tnLst>
+      <p:par>
+        <p:cTn dur="indefinite" id="13" nodeType="tmRoot" restart="never">
+          <p:childTnLst>
+            <p:seq>
+              <p:cTn id="14" nodeType="mainSeq"/>
+              <p:prevCondLst>
+                <p:cond delay="0" evt="onPrev">
+                  <p:tgtEl>
+                    <p:sldTgt/>
+                  </p:tgtEl>
+                </p:cond>
+              </p:prevCondLst>
+              <p:nextCondLst>
+                <p:cond delay="0" evt="onNext">
+                  <p:tgtEl>
+                    <p:sldTgt/>
+                  </p:tgtEl>
+                </p:cond>
+              </p:nextCondLst>
+            </p:seq>
+          </p:childTnLst>
+        </p:cTn>
+      </p:par>
+    </p:tnLst>
+  </p:timing>
 </p:sld>
 </file>
 
@@ -2498,14 +2965,14 @@
       </p:grpSpPr>
       <p:sp>
         <p:nvSpPr>
-          <p:cNvPr id="50" name="CustomShape 1"/>
+          <p:cNvPr id="52" name="CustomShape 1"/>
           <p:cNvSpPr/>
           <p:nvPr/>
         </p:nvSpPr>
         <p:spPr>
           <a:xfrm>
-            <a:off x="685800" y="1047600"/>
-            <a:ext cx="7771320" cy="1101600"/>
+            <a:off x="4206240" y="291600"/>
+            <a:ext cx="4480200" cy="1100880"/>
           </a:xfrm>
           <a:prstGeom prst="rect">
             <a:avLst/>
@@ -2526,78 +2993,55 @@
                 </a:solidFill>
                 <a:latin typeface="Calibri"/>
               </a:rPr>
-              <a:t>Team Details</a:t>
-            </a:r>
-            <a:endParaRPr/>
-          </a:p>
-        </p:txBody>
-      </p:sp>
-      <p:sp>
-        <p:nvSpPr>
-          <p:cNvPr id="51" name="CustomShape 2"/>
+              <a:t>Subscription</a:t>
+            </a:r>
+            <a:endParaRPr/>
+          </a:p>
+        </p:txBody>
+      </p:sp>
+      <p:pic>
+        <p:nvPicPr>
+          <p:cNvPr descr="" id="53" name=""/>
+          <p:cNvPicPr/>
+          <p:nvPr/>
+        </p:nvPicPr>
+        <p:blipFill>
+          <a:blip r:embed="rId1"/>
+          <a:stretch>
+            <a:fillRect/>
+          </a:stretch>
+        </p:blipFill>
+        <p:spPr>
+          <a:xfrm>
+            <a:off x="257760" y="254880"/>
+            <a:ext cx="3108600" cy="4571640"/>
+          </a:xfrm>
+          <a:prstGeom prst="rect">
+            <a:avLst/>
+          </a:prstGeom>
+        </p:spPr>
+      </p:pic>
+      <p:sp>
+        <p:nvSpPr>
+          <p:cNvPr id="54" name="CustomShape 2"/>
           <p:cNvSpPr/>
           <p:nvPr/>
         </p:nvSpPr>
         <p:spPr>
           <a:xfrm>
-            <a:off x="1371600" y="2364480"/>
-            <a:ext cx="6399720" cy="1313280"/>
-          </a:xfrm>
-          <a:prstGeom prst="rect">
-            <a:avLst/>
-          </a:prstGeom>
-        </p:spPr>
-        <p:txBody>
-          <a:bodyPr bIns="45000" lIns="90000" rIns="90000" tIns="45000"/>
-          <a:p>
-            <a:pPr algn="ctr">
-              <a:lnSpc>
-                <a:spcPct val="100000"/>
-              </a:lnSpc>
-            </a:pPr>
-            <a:r>
-              <a:rPr lang="en-US" sz="3200">
-                <a:solidFill>
-                  <a:srgbClr val="558ed5"/>
-                </a:solidFill>
-                <a:latin typeface="Calibri"/>
-              </a:rPr>
-              <a:t>(Name, Contact for all members. </a:t>
-            </a:r>
-            <a:endParaRPr/>
-          </a:p>
-          <a:p>
-            <a:pPr algn="ctr">
-              <a:lnSpc>
-                <a:spcPct val="100000"/>
-              </a:lnSpc>
-            </a:pPr>
-            <a:r>
-              <a:rPr lang="en-US" sz="3200">
-                <a:solidFill>
-                  <a:srgbClr val="558ed5"/>
-                </a:solidFill>
-                <a:latin typeface="Calibri"/>
-              </a:rPr>
-              <a:t>Focal Person and Git Link)</a:t>
-            </a:r>
-            <a:r>
-              <a:rPr i="1" lang="en-US" sz="3200">
-                <a:solidFill>
-                  <a:srgbClr val="8b8b8b"/>
-                </a:solidFill>
-                <a:latin typeface="Calibri"/>
-              </a:rPr>
-              <a:t> </a:t>
-            </a:r>
-            <a:r>
-              <a:rPr lang="en-US" sz="3200">
-                <a:solidFill>
-                  <a:srgbClr val="8b8b8b"/>
-                </a:solidFill>
-                <a:latin typeface="Calibri"/>
-              </a:rPr>
-              <a:t>  </a:t>
+            <a:off x="4023360" y="1920240"/>
+            <a:ext cx="4456800" cy="1737000"/>
+          </a:xfrm>
+          <a:prstGeom prst="rect">
+            <a:avLst/>
+          </a:prstGeom>
+        </p:spPr>
+        <p:txBody>
+          <a:bodyPr bIns="45000" lIns="90000" rIns="90000" tIns="45000" wrap="none"/>
+          <a:p>
+            <a:r>
+              <a:rPr lang="en-US" sz="2800"/>
+              <a:t>Subscribe to different categories to get notified of newly uploaded content.</a:t>
             </a:r>
             <a:endParaRPr/>
           </a:p>
@@ -2608,6 +3052,232 @@
   <p:transition>
     <p:fade/>
   </p:transition>
+  <p:timing>
+    <p:tnLst>
+      <p:par>
+        <p:cTn dur="indefinite" id="15" nodeType="tmRoot" restart="never">
+          <p:childTnLst>
+            <p:seq>
+              <p:cTn id="16" nodeType="mainSeq"/>
+              <p:prevCondLst>
+                <p:cond delay="0" evt="onPrev">
+                  <p:tgtEl>
+                    <p:sldTgt/>
+                  </p:tgtEl>
+                </p:cond>
+              </p:prevCondLst>
+              <p:nextCondLst>
+                <p:cond delay="0" evt="onNext">
+                  <p:tgtEl>
+                    <p:sldTgt/>
+                  </p:tgtEl>
+                </p:cond>
+              </p:nextCondLst>
+            </p:seq>
+          </p:childTnLst>
+        </p:cTn>
+      </p:par>
+    </p:tnLst>
+  </p:timing>
+</p:sld>
+</file>
+
+<file path=ppt/slides/slide9.xml><?xml version="1.0" encoding="utf-8"?>
+<p:sld xmlns:a="http://schemas.openxmlformats.org/drawingml/2006/main" xmlns:p="http://schemas.openxmlformats.org/presentationml/2006/main" xmlns:r="http://schemas.openxmlformats.org/officeDocument/2006/relationships">
+  <p:cSld>
+    <p:spTree>
+      <p:nvGrpSpPr>
+        <p:cNvPr id="1" name=""/>
+        <p:cNvGrpSpPr/>
+        <p:nvPr/>
+      </p:nvGrpSpPr>
+      <p:grpSpPr>
+        <a:xfrm>
+          <a:off x="0" y="0"/>
+          <a:ext cx="0" cy="0"/>
+          <a:chOff x="0" y="0"/>
+          <a:chExt cx="0" cy="0"/>
+        </a:xfrm>
+      </p:grpSpPr>
+      <p:sp>
+        <p:nvSpPr>
+          <p:cNvPr id="55" name="CustomShape 1"/>
+          <p:cNvSpPr/>
+          <p:nvPr/>
+        </p:nvSpPr>
+        <p:spPr>
+          <a:xfrm>
+            <a:off x="685800" y="209520"/>
+            <a:ext cx="7770600" cy="1100880"/>
+          </a:xfrm>
+          <a:prstGeom prst="rect">
+            <a:avLst/>
+          </a:prstGeom>
+        </p:spPr>
+        <p:txBody>
+          <a:bodyPr anchor="ctr" bIns="45000" lIns="90000" rIns="90000" tIns="45000"/>
+          <a:p>
+            <a:pPr algn="ctr">
+              <a:lnSpc>
+                <a:spcPct val="100000"/>
+              </a:lnSpc>
+            </a:pPr>
+            <a:r>
+              <a:rPr b="1" lang="en-US" sz="4400">
+                <a:solidFill>
+                  <a:srgbClr val="ffc000"/>
+                </a:solidFill>
+                <a:latin typeface="Calibri"/>
+              </a:rPr>
+              <a:t>Final Vision</a:t>
+            </a:r>
+            <a:endParaRPr/>
+          </a:p>
+        </p:txBody>
+      </p:sp>
+      <p:sp>
+        <p:nvSpPr>
+          <p:cNvPr id="56" name="CustomShape 2"/>
+          <p:cNvSpPr/>
+          <p:nvPr/>
+        </p:nvSpPr>
+        <p:spPr>
+          <a:xfrm>
+            <a:off x="1371600" y="1526400"/>
+            <a:ext cx="7223400" cy="2862360"/>
+          </a:xfrm>
+          <a:prstGeom prst="rect">
+            <a:avLst/>
+          </a:prstGeom>
+        </p:spPr>
+        <p:txBody>
+          <a:bodyPr bIns="45000" lIns="90000" rIns="90000" tIns="45000"/>
+          <a:p>
+            <a:pPr>
+              <a:lnSpc>
+                <a:spcPct val="100000"/>
+              </a:lnSpc>
+            </a:pPr>
+            <a:endParaRPr/>
+          </a:p>
+          <a:p>
+            <a:pPr>
+              <a:lnSpc>
+                <a:spcPct val="100000"/>
+              </a:lnSpc>
+              <a:buFont typeface="StarSymbol"/>
+              <a:buChar char="l"/>
+            </a:pPr>
+            <a:r>
+              <a:rPr lang="en-US" sz="3200">
+                <a:solidFill>
+                  <a:srgbClr val="558ed5"/>
+                </a:solidFill>
+                <a:latin typeface="Calibri"/>
+              </a:rPr>
+              <a:t> </a:t>
+            </a:r>
+            <a:r>
+              <a:rPr lang="en-US" sz="3200">
+                <a:solidFill>
+                  <a:srgbClr val="558ed5"/>
+                </a:solidFill>
+                <a:latin typeface="Calibri"/>
+              </a:rPr>
+              <a:t>View / Download Presentations</a:t>
+            </a:r>
+            <a:endParaRPr/>
+          </a:p>
+          <a:p>
+            <a:pPr>
+              <a:lnSpc>
+                <a:spcPct val="100000"/>
+              </a:lnSpc>
+              <a:buFont typeface="StarSymbol"/>
+              <a:buChar char="l"/>
+            </a:pPr>
+            <a:r>
+              <a:rPr lang="en-US" sz="3200">
+                <a:solidFill>
+                  <a:srgbClr val="558ed5"/>
+                </a:solidFill>
+                <a:latin typeface="Calibri"/>
+              </a:rPr>
+              <a:t> </a:t>
+            </a:r>
+            <a:r>
+              <a:rPr lang="en-US" sz="3200">
+                <a:solidFill>
+                  <a:srgbClr val="558ed5"/>
+                </a:solidFill>
+                <a:latin typeface="Calibri"/>
+              </a:rPr>
+              <a:t>Presentation rating, comment</a:t>
+            </a:r>
+            <a:endParaRPr/>
+          </a:p>
+          <a:p>
+            <a:pPr>
+              <a:lnSpc>
+                <a:spcPct val="100000"/>
+              </a:lnSpc>
+              <a:buFont typeface="StarSymbol"/>
+              <a:buChar char="l"/>
+            </a:pPr>
+            <a:r>
+              <a:rPr lang="en-US" sz="3200">
+                <a:solidFill>
+                  <a:srgbClr val="558ed5"/>
+                </a:solidFill>
+                <a:latin typeface="Calibri"/>
+              </a:rPr>
+              <a:t> </a:t>
+            </a:r>
+            <a:r>
+              <a:rPr lang="en-US" sz="3200">
+                <a:solidFill>
+                  <a:srgbClr val="558ed5"/>
+                </a:solidFill>
+                <a:latin typeface="Calibri"/>
+              </a:rPr>
+              <a:t>Blog post reader</a:t>
+            </a:r>
+            <a:endParaRPr/>
+          </a:p>
+        </p:txBody>
+      </p:sp>
+    </p:spTree>
+  </p:cSld>
+  <p:transition>
+    <p:fade/>
+  </p:transition>
+  <p:timing>
+    <p:tnLst>
+      <p:par>
+        <p:cTn dur="indefinite" id="17" nodeType="tmRoot" restart="never">
+          <p:childTnLst>
+            <p:seq>
+              <p:cTn id="18" nodeType="mainSeq"/>
+              <p:prevCondLst>
+                <p:cond delay="0" evt="onPrev">
+                  <p:tgtEl>
+                    <p:sldTgt/>
+                  </p:tgtEl>
+                </p:cond>
+              </p:prevCondLst>
+              <p:nextCondLst>
+                <p:cond delay="0" evt="onNext">
+                  <p:tgtEl>
+                    <p:sldTgt/>
+                  </p:tgtEl>
+                </p:cond>
+              </p:nextCondLst>
+            </p:seq>
+          </p:childTnLst>
+        </p:cTn>
+      </p:par>
+    </p:tnLst>
+  </p:timing>
 </p:sld>
 </file>
 

</xml_diff>